<commit_message>
AKHILESH IS THE BEST
</commit_message>
<xml_diff>
--- a/Programming.pptx
+++ b/Programming.pptx
@@ -4195,7 +4195,7 @@
                   <a:srgbClr val="FFDD00"/>
                 </a:solidFill>
               </a:rPr>
-              <a:t>Make my Akhilesh</a:t>
+              <a:t>Made my Akhilesh</a:t>
             </a:r>
             <a:endParaRPr sz="3600">
               <a:solidFill>
@@ -4736,7 +4736,7 @@
                             </p:stCondLst>
                             <p:childTnLst>
                               <p:par>
-                                <p:cTn id="5" presetID="6" presetClass="entr" presetSubtype="16" repeatCount="1000" fill="hold" grpId="0" nodeType="clickEffect">
+                                <p:cTn id="5" presetID="6" presetClass="entr" presetSubtype="16" fill="hold" grpId="0" nodeType="clickEffect">
                                   <p:stCondLst>
                                     <p:cond delay="0"/>
                                   </p:stCondLst>

</xml_diff>